<commit_message>
Nem lényeg csak PPT
</commit_message>
<xml_diff>
--- a/Chatex/assets/Chatex vizsgaremek.pptx
+++ b/Chatex/assets/Chatex vizsgaremek.pptx
@@ -8,6 +8,8 @@
     <p:sldId id="256" r:id="rId2"/>
     <p:sldId id="257" r:id="rId3"/>
     <p:sldId id="258" r:id="rId4"/>
+    <p:sldId id="259" r:id="rId5"/>
+    <p:sldId id="260" r:id="rId6"/>
   </p:sldIdLst>
   <p:sldSz cx="12192000" cy="6858000"/>
   <p:notesSz cx="6858000" cy="9144000"/>
@@ -106,6 +108,11 @@
       </a:defRPr>
     </a:lvl9pPr>
   </p:defaultTextStyle>
+  <p:extLst>
+    <p:ext uri="{EFAFB233-063F-42B5-8137-9DF3F51BA10A}">
+      <p15:sldGuideLst xmlns:p15="http://schemas.microsoft.com/office/powerpoint/2012/main"/>
+    </p:ext>
+  </p:extLst>
 </p:presentation>
 </file>
 
@@ -3647,7 +3654,9 @@
         </p:nvSpPr>
         <p:spPr/>
         <p:txBody>
-          <a:bodyPr/>
+          <a:bodyPr>
+            <a:normAutofit/>
+          </a:bodyPr>
           <a:lstStyle/>
           <a:p>
             <a:r>
@@ -3737,7 +3746,9 @@
           </a:xfrm>
         </p:spPr>
         <p:txBody>
-          <a:bodyPr/>
+          <a:bodyPr>
+            <a:normAutofit/>
+          </a:bodyPr>
           <a:lstStyle/>
           <a:p>
             <a:r>
@@ -3862,7 +3873,7 @@
             <a:pPr lvl="1"/>
             <a:r>
               <a:rPr lang="hu-HU" dirty="0"/>
-              <a:t>Main </a:t>
+              <a:t>Csak main </a:t>
             </a:r>
             <a:r>
               <a:rPr lang="hu-HU" dirty="0" err="1"/>
@@ -3870,7 +3881,7 @@
             </a:r>
             <a:r>
               <a:rPr lang="hu-HU" dirty="0"/>
-              <a:t> használata csak</a:t>
+              <a:t> használata</a:t>
             </a:r>
           </a:p>
         </p:txBody>
@@ -3885,6 +3896,1434 @@
   <p:clrMapOvr>
     <a:masterClrMapping/>
   </p:clrMapOvr>
+</p:sld>
+</file>
+
+<file path=ppt/slides/slide4.xml><?xml version="1.0" encoding="utf-8"?>
+<p:sld xmlns:a="http://schemas.openxmlformats.org/drawingml/2006/main" xmlns:r="http://schemas.openxmlformats.org/officeDocument/2006/relationships" xmlns:p="http://schemas.openxmlformats.org/presentationml/2006/main" show="0">
+  <p:cSld>
+    <p:spTree>
+      <p:nvGrpSpPr>
+        <p:cNvPr id="1" name="">
+          <a:extLst>
+            <a:ext uri="{FF2B5EF4-FFF2-40B4-BE49-F238E27FC236}">
+              <a16:creationId xmlns:a16="http://schemas.microsoft.com/office/drawing/2014/main" id="{DC7FA12D-1216-19C9-398E-7E2573C2AD48}"/>
+            </a:ext>
+          </a:extLst>
+        </p:cNvPr>
+        <p:cNvGrpSpPr/>
+        <p:nvPr/>
+      </p:nvGrpSpPr>
+      <p:grpSpPr>
+        <a:xfrm>
+          <a:off x="0" y="0"/>
+          <a:ext cx="0" cy="0"/>
+          <a:chOff x="0" y="0"/>
+          <a:chExt cx="0" cy="0"/>
+        </a:xfrm>
+      </p:grpSpPr>
+      <p:sp>
+        <p:nvSpPr>
+          <p:cNvPr id="2" name="Cím 1">
+            <a:extLst>
+              <a:ext uri="{FF2B5EF4-FFF2-40B4-BE49-F238E27FC236}">
+                <a16:creationId xmlns:a16="http://schemas.microsoft.com/office/drawing/2014/main" id="{81DA0FDC-DCC6-D468-B729-7E3FD4ACDE8A}"/>
+              </a:ext>
+            </a:extLst>
+          </p:cNvPr>
+          <p:cNvSpPr>
+            <a:spLocks noGrp="1"/>
+          </p:cNvSpPr>
+          <p:nvPr>
+            <p:ph type="title"/>
+          </p:nvPr>
+        </p:nvSpPr>
+        <p:spPr/>
+        <p:txBody>
+          <a:bodyPr/>
+          <a:lstStyle/>
+          <a:p>
+            <a:r>
+              <a:rPr lang="hu-HU" dirty="0"/>
+              <a:t>Működése:</a:t>
+            </a:r>
+          </a:p>
+        </p:txBody>
+      </p:sp>
+      <p:sp>
+        <p:nvSpPr>
+          <p:cNvPr id="3" name="Tartalom helye 2">
+            <a:extLst>
+              <a:ext uri="{FF2B5EF4-FFF2-40B4-BE49-F238E27FC236}">
+                <a16:creationId xmlns:a16="http://schemas.microsoft.com/office/drawing/2014/main" id="{A99D6F57-308E-CBDD-491B-2D6E2943EEB1}"/>
+              </a:ext>
+            </a:extLst>
+          </p:cNvPr>
+          <p:cNvSpPr>
+            <a:spLocks noGrp="1"/>
+          </p:cNvSpPr>
+          <p:nvPr>
+            <p:ph idx="1"/>
+          </p:nvPr>
+        </p:nvSpPr>
+        <p:spPr>
+          <a:xfrm>
+            <a:off x="838199" y="1825625"/>
+            <a:ext cx="11192436" cy="4351338"/>
+          </a:xfrm>
+        </p:spPr>
+        <p:txBody>
+          <a:bodyPr/>
+          <a:lstStyle/>
+          <a:p>
+            <a:r>
+              <a:rPr lang="hu-HU" dirty="0"/>
+              <a:t>Az alkalmazás működése viszonylag egyszerűen működik:</a:t>
+            </a:r>
+          </a:p>
+          <a:p>
+            <a:pPr lvl="1"/>
+            <a:r>
+              <a:rPr lang="hu-HU" dirty="0"/>
+              <a:t>Dart fájlokból felépül a </a:t>
+            </a:r>
+            <a:r>
+              <a:rPr lang="hu-HU" dirty="0" err="1"/>
+              <a:t>widgeteken</a:t>
+            </a:r>
+            <a:r>
+              <a:rPr lang="hu-HU" dirty="0"/>
+              <a:t> alapuló </a:t>
+            </a:r>
+            <a:r>
+              <a:rPr lang="hu-HU" dirty="0" err="1"/>
+              <a:t>StatefulWidget</a:t>
+            </a:r>
+            <a:r>
+              <a:rPr lang="hu-HU" dirty="0"/>
+              <a:t> melyben a </a:t>
+            </a:r>
+            <a:r>
+              <a:rPr lang="hu-HU" dirty="0" err="1"/>
+              <a:t>Scaffold</a:t>
+            </a:r>
+            <a:r>
+              <a:rPr lang="hu-HU" dirty="0"/>
+              <a:t> fő </a:t>
+            </a:r>
+            <a:r>
+              <a:rPr lang="hu-HU" dirty="0" err="1"/>
+              <a:t>widgetet</a:t>
+            </a:r>
+            <a:r>
+              <a:rPr lang="hu-HU" dirty="0"/>
+              <a:t> használjuk és azok paramétereit (több </a:t>
+            </a:r>
+            <a:r>
+              <a:rPr lang="hu-HU" dirty="0" err="1"/>
+              <a:t>widgettel</a:t>
+            </a:r>
+            <a:r>
+              <a:rPr lang="hu-HU" dirty="0"/>
+              <a:t>)</a:t>
+            </a:r>
+          </a:p>
+          <a:p>
+            <a:pPr lvl="1"/>
+            <a:r>
+              <a:rPr lang="hu-HU" dirty="0"/>
+              <a:t>Az inputokat egy </a:t>
+            </a:r>
+            <a:r>
+              <a:rPr lang="hu-HU" dirty="0" err="1"/>
+              <a:t>FormBuilder</a:t>
+            </a:r>
+            <a:r>
+              <a:rPr lang="hu-HU" dirty="0"/>
+              <a:t>-el építjük fel, és </a:t>
+            </a:r>
+            <a:r>
+              <a:rPr lang="hu-HU" dirty="0" err="1"/>
+              <a:t>FormBuilderValidator</a:t>
+            </a:r>
+            <a:r>
+              <a:rPr lang="hu-HU" dirty="0"/>
+              <a:t> </a:t>
+            </a:r>
+            <a:r>
+              <a:rPr lang="hu-HU" dirty="0" err="1"/>
+              <a:t>packagel</a:t>
+            </a:r>
+            <a:r>
+              <a:rPr lang="hu-HU" dirty="0"/>
+              <a:t> ellenőrizzük mielőtt átadnánk az </a:t>
+            </a:r>
+            <a:r>
+              <a:rPr lang="hu-HU" dirty="0" err="1"/>
+              <a:t>Auth.dart</a:t>
+            </a:r>
+            <a:r>
+              <a:rPr lang="hu-HU" dirty="0"/>
+              <a:t> logikájának.</a:t>
+            </a:r>
+          </a:p>
+          <a:p>
+            <a:pPr lvl="1"/>
+            <a:r>
+              <a:rPr lang="hu-HU" dirty="0"/>
+              <a:t>Az </a:t>
+            </a:r>
+            <a:r>
+              <a:rPr lang="hu-HU" dirty="0" err="1"/>
+              <a:t>Auth.dart</a:t>
+            </a:r>
+            <a:r>
+              <a:rPr lang="hu-HU" dirty="0"/>
+              <a:t> logikája egy külön </a:t>
+            </a:r>
+            <a:r>
+              <a:rPr lang="hu-HU" dirty="0" err="1"/>
+              <a:t>package</a:t>
+            </a:r>
+            <a:r>
+              <a:rPr lang="hu-HU" dirty="0"/>
+              <a:t>-el kommunikál a felhasználóval ami a </a:t>
+            </a:r>
+            <a:r>
+              <a:rPr lang="hu-HU" dirty="0" err="1"/>
+              <a:t>FlutterToast</a:t>
+            </a:r>
+            <a:r>
+              <a:rPr lang="hu-HU" dirty="0"/>
+              <a:t> (context-el hogy minden platformon megtudjon jelenni) </a:t>
+            </a:r>
+            <a:r>
+              <a:rPr lang="hu-HU" dirty="0" err="1"/>
+              <a:t>package</a:t>
+            </a:r>
+            <a:r>
+              <a:rPr lang="hu-HU" dirty="0"/>
+              <a:t>-el történik, még akkor is ez a válasz érkezik amikor a HTTP POST kérésről érkező választ kapjuk.</a:t>
+            </a:r>
+          </a:p>
+          <a:p>
+            <a:pPr lvl="1"/>
+            <a:r>
+              <a:rPr lang="hu-HU" dirty="0"/>
+              <a:t>A POST kérések kommunikálnak az XAMPP szerverrel (SZERVERNEK FUTTNIA KELL) és emiatt a meghívott PHP-k végre tudnak </a:t>
+            </a:r>
+            <a:r>
+              <a:rPr lang="hu-HU" dirty="0" err="1"/>
+              <a:t>hajtódni</a:t>
+            </a:r>
+            <a:r>
+              <a:rPr lang="hu-HU" dirty="0"/>
+              <a:t> (adatbázis kérések, regisztráció, bejelentkezés, chat felület betöltése, </a:t>
+            </a:r>
+            <a:r>
+              <a:rPr lang="hu-HU" dirty="0" err="1"/>
+              <a:t>stb</a:t>
+            </a:r>
+            <a:r>
+              <a:rPr lang="hu-HU" dirty="0"/>
+              <a:t>…)</a:t>
+            </a:r>
+          </a:p>
+        </p:txBody>
+      </p:sp>
+    </p:spTree>
+    <p:extLst>
+      <p:ext uri="{BB962C8B-B14F-4D97-AF65-F5344CB8AC3E}">
+        <p14:creationId xmlns:p14="http://schemas.microsoft.com/office/powerpoint/2010/main" val="1120194364"/>
+      </p:ext>
+    </p:extLst>
+  </p:cSld>
+  <p:clrMapOvr>
+    <a:masterClrMapping/>
+  </p:clrMapOvr>
+</p:sld>
+</file>
+
+<file path=ppt/slides/slide5.xml><?xml version="1.0" encoding="utf-8"?>
+<p:sld xmlns:a="http://schemas.openxmlformats.org/drawingml/2006/main" xmlns:r="http://schemas.openxmlformats.org/officeDocument/2006/relationships" xmlns:p="http://schemas.openxmlformats.org/presentationml/2006/main" show="0">
+  <p:cSld>
+    <p:spTree>
+      <p:nvGrpSpPr>
+        <p:cNvPr id="1" name="">
+          <a:extLst>
+            <a:ext uri="{FF2B5EF4-FFF2-40B4-BE49-F238E27FC236}">
+              <a16:creationId xmlns:a16="http://schemas.microsoft.com/office/drawing/2014/main" id="{061D1732-9437-67C2-6313-4B09EC45E62B}"/>
+            </a:ext>
+          </a:extLst>
+        </p:cNvPr>
+        <p:cNvGrpSpPr/>
+        <p:nvPr/>
+      </p:nvGrpSpPr>
+      <p:grpSpPr>
+        <a:xfrm>
+          <a:off x="0" y="0"/>
+          <a:ext cx="0" cy="0"/>
+          <a:chOff x="0" y="0"/>
+          <a:chExt cx="0" cy="0"/>
+        </a:xfrm>
+      </p:grpSpPr>
+      <p:sp>
+        <p:nvSpPr>
+          <p:cNvPr id="2" name="Cím 1">
+            <a:extLst>
+              <a:ext uri="{FF2B5EF4-FFF2-40B4-BE49-F238E27FC236}">
+                <a16:creationId xmlns:a16="http://schemas.microsoft.com/office/drawing/2014/main" id="{18881A66-21B6-D9EC-A9E0-7038C7CDCD8B}"/>
+              </a:ext>
+            </a:extLst>
+          </p:cNvPr>
+          <p:cNvSpPr>
+            <a:spLocks noGrp="1"/>
+          </p:cNvSpPr>
+          <p:nvPr>
+            <p:ph type="title"/>
+          </p:nvPr>
+        </p:nvSpPr>
+        <p:spPr/>
+        <p:txBody>
+          <a:bodyPr/>
+          <a:lstStyle/>
+          <a:p>
+            <a:r>
+              <a:rPr lang="hu-HU" dirty="0"/>
+              <a:t>Működése:</a:t>
+            </a:r>
+          </a:p>
+        </p:txBody>
+      </p:sp>
+      <p:pic>
+        <p:nvPicPr>
+          <p:cNvPr id="7" name="Tartalom helye 6" descr="A képen szöveg, képernyőkép, Betűtípus, szoftver látható&#10;&#10;Előfordulhat, hogy a mesterséges intelligencia által létrehozott tartalom helytelen.">
+            <a:extLst>
+              <a:ext uri="{FF2B5EF4-FFF2-40B4-BE49-F238E27FC236}">
+                <a16:creationId xmlns:a16="http://schemas.microsoft.com/office/drawing/2014/main" id="{44B5501D-038D-07CB-B69D-012E5D1F8EA8}"/>
+              </a:ext>
+            </a:extLst>
+          </p:cNvPr>
+          <p:cNvPicPr>
+            <a:picLocks noGrp="1" noChangeAspect="1"/>
+          </p:cNvPicPr>
+          <p:nvPr>
+            <p:ph idx="1"/>
+          </p:nvPr>
+        </p:nvPicPr>
+        <p:blipFill>
+          <a:blip r:embed="rId2">
+            <a:extLst>
+              <a:ext uri="{28A0092B-C50C-407E-A947-70E740481C1C}">
+                <a14:useLocalDpi xmlns:a14="http://schemas.microsoft.com/office/drawing/2010/main" val="0"/>
+              </a:ext>
+            </a:extLst>
+          </a:blip>
+          <a:stretch>
+            <a:fillRect/>
+          </a:stretch>
+        </p:blipFill>
+        <p:spPr>
+          <a:xfrm>
+            <a:off x="877592" y="1432641"/>
+            <a:ext cx="2335992" cy="5191094"/>
+          </a:xfrm>
+        </p:spPr>
+      </p:pic>
+      <p:pic>
+        <p:nvPicPr>
+          <p:cNvPr id="9" name="Kép 8" descr="A képen szöveg, képernyőkép, Betűtípus, tervezés látható&#10;&#10;Előfordulhat, hogy a mesterséges intelligencia által létrehozott tartalom helytelen.">
+            <a:extLst>
+              <a:ext uri="{FF2B5EF4-FFF2-40B4-BE49-F238E27FC236}">
+                <a16:creationId xmlns:a16="http://schemas.microsoft.com/office/drawing/2014/main" id="{72A81232-7DCB-D8A6-AF1D-8FF961CB42C5}"/>
+              </a:ext>
+            </a:extLst>
+          </p:cNvPr>
+          <p:cNvPicPr>
+            <a:picLocks noChangeAspect="1"/>
+          </p:cNvPicPr>
+          <p:nvPr/>
+        </p:nvPicPr>
+        <p:blipFill>
+          <a:blip r:embed="rId3">
+            <a:extLst>
+              <a:ext uri="{28A0092B-C50C-407E-A947-70E740481C1C}">
+                <a14:useLocalDpi xmlns:a14="http://schemas.microsoft.com/office/drawing/2010/main" val="0"/>
+              </a:ext>
+            </a:extLst>
+          </a:blip>
+          <a:stretch>
+            <a:fillRect/>
+          </a:stretch>
+        </p:blipFill>
+        <p:spPr>
+          <a:xfrm>
+            <a:off x="3371214" y="1432535"/>
+            <a:ext cx="2336040" cy="5191200"/>
+          </a:xfrm>
+          <a:prstGeom prst="rect">
+            <a:avLst/>
+          </a:prstGeom>
+        </p:spPr>
+      </p:pic>
+      <p:pic>
+        <p:nvPicPr>
+          <p:cNvPr id="11" name="Kép 10" descr="A képen szöveg, képernyőkép, Betűtípus, tervezés látható&#10;&#10;Előfordulhat, hogy a mesterséges intelligencia által létrehozott tartalom helytelen.">
+            <a:extLst>
+              <a:ext uri="{FF2B5EF4-FFF2-40B4-BE49-F238E27FC236}">
+                <a16:creationId xmlns:a16="http://schemas.microsoft.com/office/drawing/2014/main" id="{D9CFDAFA-2732-A073-7FED-B96745579035}"/>
+              </a:ext>
+            </a:extLst>
+          </p:cNvPr>
+          <p:cNvPicPr>
+            <a:picLocks noChangeAspect="1"/>
+          </p:cNvPicPr>
+          <p:nvPr/>
+        </p:nvPicPr>
+        <p:blipFill>
+          <a:blip r:embed="rId4">
+            <a:extLst>
+              <a:ext uri="{28A0092B-C50C-407E-A947-70E740481C1C}">
+                <a14:useLocalDpi xmlns:a14="http://schemas.microsoft.com/office/drawing/2010/main" val="0"/>
+              </a:ext>
+            </a:extLst>
+          </a:blip>
+          <a:stretch>
+            <a:fillRect/>
+          </a:stretch>
+        </p:blipFill>
+        <p:spPr>
+          <a:xfrm>
+            <a:off x="5904228" y="1432535"/>
+            <a:ext cx="2336040" cy="5191200"/>
+          </a:xfrm>
+          <a:prstGeom prst="rect">
+            <a:avLst/>
+          </a:prstGeom>
+        </p:spPr>
+      </p:pic>
+      <p:sp>
+        <p:nvSpPr>
+          <p:cNvPr id="13" name="Szövegdoboz 12">
+            <a:extLst>
+              <a:ext uri="{FF2B5EF4-FFF2-40B4-BE49-F238E27FC236}">
+                <a16:creationId xmlns:a16="http://schemas.microsoft.com/office/drawing/2014/main" id="{19211EDF-0F68-03BE-0FC4-C1CE109EBF00}"/>
+              </a:ext>
+            </a:extLst>
+          </p:cNvPr>
+          <p:cNvSpPr txBox="1"/>
+          <p:nvPr/>
+        </p:nvSpPr>
+        <p:spPr>
+          <a:xfrm>
+            <a:off x="8641976" y="1541929"/>
+            <a:ext cx="3083859" cy="1938992"/>
+          </a:xfrm>
+          <a:prstGeom prst="rect">
+            <a:avLst/>
+          </a:prstGeom>
+          <a:noFill/>
+        </p:spPr>
+        <p:txBody>
+          <a:bodyPr wrap="square" rtlCol="0">
+            <a:spAutoFit/>
+          </a:bodyPr>
+          <a:lstStyle/>
+          <a:p>
+            <a:r>
+              <a:rPr lang="hu-HU" sz="2400" dirty="0">
+                <a:latin typeface="Arial" panose="020B0604020202020204" pitchFamily="34" charset="0"/>
+                <a:cs typeface="Arial" panose="020B0604020202020204" pitchFamily="34" charset="0"/>
+              </a:rPr>
+              <a:t>Miután megfelelő adatokat írtunk be akkor tudunk regisztrálni és lefut a következő logika:</a:t>
+            </a:r>
+          </a:p>
+        </p:txBody>
+      </p:sp>
+      <p:pic>
+        <p:nvPicPr>
+          <p:cNvPr id="15" name="Kép 14">
+            <a:extLst>
+              <a:ext uri="{FF2B5EF4-FFF2-40B4-BE49-F238E27FC236}">
+                <a16:creationId xmlns:a16="http://schemas.microsoft.com/office/drawing/2014/main" id="{B25C6335-EEB8-6ECF-4048-9169D7D02AD5}"/>
+              </a:ext>
+            </a:extLst>
+          </p:cNvPr>
+          <p:cNvPicPr>
+            <a:picLocks noChangeAspect="1"/>
+          </p:cNvPicPr>
+          <p:nvPr/>
+        </p:nvPicPr>
+        <p:blipFill>
+          <a:blip r:embed="rId5"/>
+          <a:stretch>
+            <a:fillRect/>
+          </a:stretch>
+        </p:blipFill>
+        <p:spPr>
+          <a:xfrm>
+            <a:off x="877592" y="1432535"/>
+            <a:ext cx="5236332" cy="4814048"/>
+          </a:xfrm>
+          <a:prstGeom prst="rect">
+            <a:avLst/>
+          </a:prstGeom>
+        </p:spPr>
+      </p:pic>
+      <p:pic>
+        <p:nvPicPr>
+          <p:cNvPr id="17" name="Kép 16">
+            <a:extLst>
+              <a:ext uri="{FF2B5EF4-FFF2-40B4-BE49-F238E27FC236}">
+                <a16:creationId xmlns:a16="http://schemas.microsoft.com/office/drawing/2014/main" id="{6665BE85-D4B3-713C-50E8-9551A30F679C}"/>
+              </a:ext>
+            </a:extLst>
+          </p:cNvPr>
+          <p:cNvPicPr>
+            <a:picLocks noChangeAspect="1"/>
+          </p:cNvPicPr>
+          <p:nvPr/>
+        </p:nvPicPr>
+        <p:blipFill>
+          <a:blip r:embed="rId6"/>
+          <a:stretch>
+            <a:fillRect/>
+          </a:stretch>
+        </p:blipFill>
+        <p:spPr>
+          <a:xfrm>
+            <a:off x="6310898" y="1439072"/>
+            <a:ext cx="5323247" cy="4813200"/>
+          </a:xfrm>
+          <a:prstGeom prst="rect">
+            <a:avLst/>
+          </a:prstGeom>
+        </p:spPr>
+      </p:pic>
+    </p:spTree>
+    <p:extLst>
+      <p:ext uri="{BB962C8B-B14F-4D97-AF65-F5344CB8AC3E}">
+        <p14:creationId xmlns:p14="http://schemas.microsoft.com/office/powerpoint/2010/main" val="2280375223"/>
+      </p:ext>
+    </p:extLst>
+  </p:cSld>
+  <p:clrMapOvr>
+    <a:masterClrMapping/>
+  </p:clrMapOvr>
+  <p:timing>
+    <p:tnLst>
+      <p:par>
+        <p:cTn id="1" dur="indefinite" restart="never" nodeType="tmRoot">
+          <p:childTnLst>
+            <p:seq concurrent="1" nextAc="seek">
+              <p:cTn id="2" dur="indefinite" nodeType="mainSeq">
+                <p:childTnLst>
+                  <p:par>
+                    <p:cTn id="3" fill="hold">
+                      <p:stCondLst>
+                        <p:cond delay="indefinite"/>
+                      </p:stCondLst>
+                      <p:childTnLst>
+                        <p:par>
+                          <p:cTn id="4" fill="hold">
+                            <p:stCondLst>
+                              <p:cond delay="0"/>
+                            </p:stCondLst>
+                            <p:childTnLst>
+                              <p:par>
+                                <p:cTn id="5" presetID="2" presetClass="entr" presetSubtype="8" fill="hold" nodeType="clickEffect">
+                                  <p:stCondLst>
+                                    <p:cond delay="0"/>
+                                  </p:stCondLst>
+                                  <p:childTnLst>
+                                    <p:set>
+                                      <p:cBhvr>
+                                        <p:cTn id="6" dur="1" fill="hold">
+                                          <p:stCondLst>
+                                            <p:cond delay="0"/>
+                                          </p:stCondLst>
+                                        </p:cTn>
+                                        <p:tgtEl>
+                                          <p:spTgt spid="7"/>
+                                        </p:tgtEl>
+                                        <p:attrNameLst>
+                                          <p:attrName>style.visibility</p:attrName>
+                                        </p:attrNameLst>
+                                      </p:cBhvr>
+                                      <p:to>
+                                        <p:strVal val="visible"/>
+                                      </p:to>
+                                    </p:set>
+                                    <p:anim calcmode="lin" valueType="num">
+                                      <p:cBhvr additive="base">
+                                        <p:cTn id="7" dur="500" fill="hold"/>
+                                        <p:tgtEl>
+                                          <p:spTgt spid="7"/>
+                                        </p:tgtEl>
+                                        <p:attrNameLst>
+                                          <p:attrName>ppt_x</p:attrName>
+                                        </p:attrNameLst>
+                                      </p:cBhvr>
+                                      <p:tavLst>
+                                        <p:tav tm="0">
+                                          <p:val>
+                                            <p:strVal val="0-#ppt_w/2"/>
+                                          </p:val>
+                                        </p:tav>
+                                        <p:tav tm="100000">
+                                          <p:val>
+                                            <p:strVal val="#ppt_x"/>
+                                          </p:val>
+                                        </p:tav>
+                                      </p:tavLst>
+                                    </p:anim>
+                                    <p:anim calcmode="lin" valueType="num">
+                                      <p:cBhvr additive="base">
+                                        <p:cTn id="8" dur="500" fill="hold"/>
+                                        <p:tgtEl>
+                                          <p:spTgt spid="7"/>
+                                        </p:tgtEl>
+                                        <p:attrNameLst>
+                                          <p:attrName>ppt_y</p:attrName>
+                                        </p:attrNameLst>
+                                      </p:cBhvr>
+                                      <p:tavLst>
+                                        <p:tav tm="0">
+                                          <p:val>
+                                            <p:strVal val="#ppt_y"/>
+                                          </p:val>
+                                        </p:tav>
+                                        <p:tav tm="100000">
+                                          <p:val>
+                                            <p:strVal val="#ppt_y"/>
+                                          </p:val>
+                                        </p:tav>
+                                      </p:tavLst>
+                                    </p:anim>
+                                  </p:childTnLst>
+                                </p:cTn>
+                              </p:par>
+                            </p:childTnLst>
+                          </p:cTn>
+                        </p:par>
+                      </p:childTnLst>
+                    </p:cTn>
+                  </p:par>
+                  <p:par>
+                    <p:cTn id="9" fill="hold">
+                      <p:stCondLst>
+                        <p:cond delay="indefinite"/>
+                      </p:stCondLst>
+                      <p:childTnLst>
+                        <p:par>
+                          <p:cTn id="10" fill="hold">
+                            <p:stCondLst>
+                              <p:cond delay="0"/>
+                            </p:stCondLst>
+                            <p:childTnLst>
+                              <p:par>
+                                <p:cTn id="11" presetID="2" presetClass="entr" presetSubtype="8" fill="hold" nodeType="clickEffect">
+                                  <p:stCondLst>
+                                    <p:cond delay="0"/>
+                                  </p:stCondLst>
+                                  <p:childTnLst>
+                                    <p:set>
+                                      <p:cBhvr>
+                                        <p:cTn id="12" dur="1" fill="hold">
+                                          <p:stCondLst>
+                                            <p:cond delay="0"/>
+                                          </p:stCondLst>
+                                        </p:cTn>
+                                        <p:tgtEl>
+                                          <p:spTgt spid="9"/>
+                                        </p:tgtEl>
+                                        <p:attrNameLst>
+                                          <p:attrName>style.visibility</p:attrName>
+                                        </p:attrNameLst>
+                                      </p:cBhvr>
+                                      <p:to>
+                                        <p:strVal val="visible"/>
+                                      </p:to>
+                                    </p:set>
+                                    <p:anim calcmode="lin" valueType="num">
+                                      <p:cBhvr additive="base">
+                                        <p:cTn id="13" dur="500" fill="hold"/>
+                                        <p:tgtEl>
+                                          <p:spTgt spid="9"/>
+                                        </p:tgtEl>
+                                        <p:attrNameLst>
+                                          <p:attrName>ppt_x</p:attrName>
+                                        </p:attrNameLst>
+                                      </p:cBhvr>
+                                      <p:tavLst>
+                                        <p:tav tm="0">
+                                          <p:val>
+                                            <p:strVal val="0-#ppt_w/2"/>
+                                          </p:val>
+                                        </p:tav>
+                                        <p:tav tm="100000">
+                                          <p:val>
+                                            <p:strVal val="#ppt_x"/>
+                                          </p:val>
+                                        </p:tav>
+                                      </p:tavLst>
+                                    </p:anim>
+                                    <p:anim calcmode="lin" valueType="num">
+                                      <p:cBhvr additive="base">
+                                        <p:cTn id="14" dur="500" fill="hold"/>
+                                        <p:tgtEl>
+                                          <p:spTgt spid="9"/>
+                                        </p:tgtEl>
+                                        <p:attrNameLst>
+                                          <p:attrName>ppt_y</p:attrName>
+                                        </p:attrNameLst>
+                                      </p:cBhvr>
+                                      <p:tavLst>
+                                        <p:tav tm="0">
+                                          <p:val>
+                                            <p:strVal val="#ppt_y"/>
+                                          </p:val>
+                                        </p:tav>
+                                        <p:tav tm="100000">
+                                          <p:val>
+                                            <p:strVal val="#ppt_y"/>
+                                          </p:val>
+                                        </p:tav>
+                                      </p:tavLst>
+                                    </p:anim>
+                                  </p:childTnLst>
+                                </p:cTn>
+                              </p:par>
+                            </p:childTnLst>
+                          </p:cTn>
+                        </p:par>
+                      </p:childTnLst>
+                    </p:cTn>
+                  </p:par>
+                  <p:par>
+                    <p:cTn id="15" fill="hold">
+                      <p:stCondLst>
+                        <p:cond delay="indefinite"/>
+                      </p:stCondLst>
+                      <p:childTnLst>
+                        <p:par>
+                          <p:cTn id="16" fill="hold">
+                            <p:stCondLst>
+                              <p:cond delay="0"/>
+                            </p:stCondLst>
+                            <p:childTnLst>
+                              <p:par>
+                                <p:cTn id="17" presetID="2" presetClass="entr" presetSubtype="8" fill="hold" nodeType="clickEffect">
+                                  <p:stCondLst>
+                                    <p:cond delay="0"/>
+                                  </p:stCondLst>
+                                  <p:childTnLst>
+                                    <p:set>
+                                      <p:cBhvr>
+                                        <p:cTn id="18" dur="1" fill="hold">
+                                          <p:stCondLst>
+                                            <p:cond delay="0"/>
+                                          </p:stCondLst>
+                                        </p:cTn>
+                                        <p:tgtEl>
+                                          <p:spTgt spid="11"/>
+                                        </p:tgtEl>
+                                        <p:attrNameLst>
+                                          <p:attrName>style.visibility</p:attrName>
+                                        </p:attrNameLst>
+                                      </p:cBhvr>
+                                      <p:to>
+                                        <p:strVal val="visible"/>
+                                      </p:to>
+                                    </p:set>
+                                    <p:anim calcmode="lin" valueType="num">
+                                      <p:cBhvr additive="base">
+                                        <p:cTn id="19" dur="500" fill="hold"/>
+                                        <p:tgtEl>
+                                          <p:spTgt spid="11"/>
+                                        </p:tgtEl>
+                                        <p:attrNameLst>
+                                          <p:attrName>ppt_x</p:attrName>
+                                        </p:attrNameLst>
+                                      </p:cBhvr>
+                                      <p:tavLst>
+                                        <p:tav tm="0">
+                                          <p:val>
+                                            <p:strVal val="0-#ppt_w/2"/>
+                                          </p:val>
+                                        </p:tav>
+                                        <p:tav tm="100000">
+                                          <p:val>
+                                            <p:strVal val="#ppt_x"/>
+                                          </p:val>
+                                        </p:tav>
+                                      </p:tavLst>
+                                    </p:anim>
+                                    <p:anim calcmode="lin" valueType="num">
+                                      <p:cBhvr additive="base">
+                                        <p:cTn id="20" dur="500" fill="hold"/>
+                                        <p:tgtEl>
+                                          <p:spTgt spid="11"/>
+                                        </p:tgtEl>
+                                        <p:attrNameLst>
+                                          <p:attrName>ppt_y</p:attrName>
+                                        </p:attrNameLst>
+                                      </p:cBhvr>
+                                      <p:tavLst>
+                                        <p:tav tm="0">
+                                          <p:val>
+                                            <p:strVal val="#ppt_y"/>
+                                          </p:val>
+                                        </p:tav>
+                                        <p:tav tm="100000">
+                                          <p:val>
+                                            <p:strVal val="#ppt_y"/>
+                                          </p:val>
+                                        </p:tav>
+                                      </p:tavLst>
+                                    </p:anim>
+                                  </p:childTnLst>
+                                </p:cTn>
+                              </p:par>
+                            </p:childTnLst>
+                          </p:cTn>
+                        </p:par>
+                      </p:childTnLst>
+                    </p:cTn>
+                  </p:par>
+                  <p:par>
+                    <p:cTn id="21" fill="hold">
+                      <p:stCondLst>
+                        <p:cond delay="indefinite"/>
+                      </p:stCondLst>
+                      <p:childTnLst>
+                        <p:par>
+                          <p:cTn id="22" fill="hold">
+                            <p:stCondLst>
+                              <p:cond delay="0"/>
+                            </p:stCondLst>
+                            <p:childTnLst>
+                              <p:par>
+                                <p:cTn id="23" presetID="1" presetClass="entr" presetSubtype="0" fill="hold" grpId="0" nodeType="clickEffect">
+                                  <p:stCondLst>
+                                    <p:cond delay="0"/>
+                                  </p:stCondLst>
+                                  <p:childTnLst>
+                                    <p:set>
+                                      <p:cBhvr>
+                                        <p:cTn id="24" dur="1" fill="hold">
+                                          <p:stCondLst>
+                                            <p:cond delay="0"/>
+                                          </p:stCondLst>
+                                        </p:cTn>
+                                        <p:tgtEl>
+                                          <p:spTgt spid="13"/>
+                                        </p:tgtEl>
+                                        <p:attrNameLst>
+                                          <p:attrName>style.visibility</p:attrName>
+                                        </p:attrNameLst>
+                                      </p:cBhvr>
+                                      <p:to>
+                                        <p:strVal val="visible"/>
+                                      </p:to>
+                                    </p:set>
+                                  </p:childTnLst>
+                                </p:cTn>
+                              </p:par>
+                            </p:childTnLst>
+                          </p:cTn>
+                        </p:par>
+                      </p:childTnLst>
+                    </p:cTn>
+                  </p:par>
+                  <p:par>
+                    <p:cTn id="25" fill="hold">
+                      <p:stCondLst>
+                        <p:cond delay="indefinite"/>
+                      </p:stCondLst>
+                      <p:childTnLst>
+                        <p:par>
+                          <p:cTn id="26" fill="hold">
+                            <p:stCondLst>
+                              <p:cond delay="0"/>
+                            </p:stCondLst>
+                            <p:childTnLst>
+                              <p:par>
+                                <p:cTn id="27" presetID="2" presetClass="exit" presetSubtype="4" fill="hold" nodeType="clickEffect">
+                                  <p:stCondLst>
+                                    <p:cond delay="0"/>
+                                  </p:stCondLst>
+                                  <p:childTnLst>
+                                    <p:anim calcmode="lin" valueType="num">
+                                      <p:cBhvr additive="base">
+                                        <p:cTn id="28" dur="500"/>
+                                        <p:tgtEl>
+                                          <p:spTgt spid="7"/>
+                                        </p:tgtEl>
+                                        <p:attrNameLst>
+                                          <p:attrName>ppt_x</p:attrName>
+                                        </p:attrNameLst>
+                                      </p:cBhvr>
+                                      <p:tavLst>
+                                        <p:tav tm="0">
+                                          <p:val>
+                                            <p:strVal val="ppt_x"/>
+                                          </p:val>
+                                        </p:tav>
+                                        <p:tav tm="100000">
+                                          <p:val>
+                                            <p:strVal val="ppt_x"/>
+                                          </p:val>
+                                        </p:tav>
+                                      </p:tavLst>
+                                    </p:anim>
+                                    <p:anim calcmode="lin" valueType="num">
+                                      <p:cBhvr additive="base">
+                                        <p:cTn id="29" dur="500"/>
+                                        <p:tgtEl>
+                                          <p:spTgt spid="7"/>
+                                        </p:tgtEl>
+                                        <p:attrNameLst>
+                                          <p:attrName>ppt_y</p:attrName>
+                                        </p:attrNameLst>
+                                      </p:cBhvr>
+                                      <p:tavLst>
+                                        <p:tav tm="0">
+                                          <p:val>
+                                            <p:strVal val="ppt_y"/>
+                                          </p:val>
+                                        </p:tav>
+                                        <p:tav tm="100000">
+                                          <p:val>
+                                            <p:strVal val="1+ppt_h/2"/>
+                                          </p:val>
+                                        </p:tav>
+                                      </p:tavLst>
+                                    </p:anim>
+                                    <p:set>
+                                      <p:cBhvr>
+                                        <p:cTn id="30" dur="1" fill="hold">
+                                          <p:stCondLst>
+                                            <p:cond delay="499"/>
+                                          </p:stCondLst>
+                                        </p:cTn>
+                                        <p:tgtEl>
+                                          <p:spTgt spid="7"/>
+                                        </p:tgtEl>
+                                        <p:attrNameLst>
+                                          <p:attrName>style.visibility</p:attrName>
+                                        </p:attrNameLst>
+                                      </p:cBhvr>
+                                      <p:to>
+                                        <p:strVal val="hidden"/>
+                                      </p:to>
+                                    </p:set>
+                                  </p:childTnLst>
+                                </p:cTn>
+                              </p:par>
+                            </p:childTnLst>
+                          </p:cTn>
+                        </p:par>
+                      </p:childTnLst>
+                    </p:cTn>
+                  </p:par>
+                  <p:par>
+                    <p:cTn id="31" fill="hold">
+                      <p:stCondLst>
+                        <p:cond delay="indefinite"/>
+                      </p:stCondLst>
+                      <p:childTnLst>
+                        <p:par>
+                          <p:cTn id="32" fill="hold">
+                            <p:stCondLst>
+                              <p:cond delay="0"/>
+                            </p:stCondLst>
+                            <p:childTnLst>
+                              <p:par>
+                                <p:cTn id="33" presetID="2" presetClass="exit" presetSubtype="4" fill="hold" nodeType="clickEffect">
+                                  <p:stCondLst>
+                                    <p:cond delay="0"/>
+                                  </p:stCondLst>
+                                  <p:childTnLst>
+                                    <p:anim calcmode="lin" valueType="num">
+                                      <p:cBhvr additive="base">
+                                        <p:cTn id="34" dur="500"/>
+                                        <p:tgtEl>
+                                          <p:spTgt spid="9"/>
+                                        </p:tgtEl>
+                                        <p:attrNameLst>
+                                          <p:attrName>ppt_x</p:attrName>
+                                        </p:attrNameLst>
+                                      </p:cBhvr>
+                                      <p:tavLst>
+                                        <p:tav tm="0">
+                                          <p:val>
+                                            <p:strVal val="ppt_x"/>
+                                          </p:val>
+                                        </p:tav>
+                                        <p:tav tm="100000">
+                                          <p:val>
+                                            <p:strVal val="ppt_x"/>
+                                          </p:val>
+                                        </p:tav>
+                                      </p:tavLst>
+                                    </p:anim>
+                                    <p:anim calcmode="lin" valueType="num">
+                                      <p:cBhvr additive="base">
+                                        <p:cTn id="35" dur="500"/>
+                                        <p:tgtEl>
+                                          <p:spTgt spid="9"/>
+                                        </p:tgtEl>
+                                        <p:attrNameLst>
+                                          <p:attrName>ppt_y</p:attrName>
+                                        </p:attrNameLst>
+                                      </p:cBhvr>
+                                      <p:tavLst>
+                                        <p:tav tm="0">
+                                          <p:val>
+                                            <p:strVal val="ppt_y"/>
+                                          </p:val>
+                                        </p:tav>
+                                        <p:tav tm="100000">
+                                          <p:val>
+                                            <p:strVal val="1+ppt_h/2"/>
+                                          </p:val>
+                                        </p:tav>
+                                      </p:tavLst>
+                                    </p:anim>
+                                    <p:set>
+                                      <p:cBhvr>
+                                        <p:cTn id="36" dur="1" fill="hold">
+                                          <p:stCondLst>
+                                            <p:cond delay="499"/>
+                                          </p:stCondLst>
+                                        </p:cTn>
+                                        <p:tgtEl>
+                                          <p:spTgt spid="9"/>
+                                        </p:tgtEl>
+                                        <p:attrNameLst>
+                                          <p:attrName>style.visibility</p:attrName>
+                                        </p:attrNameLst>
+                                      </p:cBhvr>
+                                      <p:to>
+                                        <p:strVal val="hidden"/>
+                                      </p:to>
+                                    </p:set>
+                                  </p:childTnLst>
+                                </p:cTn>
+                              </p:par>
+                            </p:childTnLst>
+                          </p:cTn>
+                        </p:par>
+                      </p:childTnLst>
+                    </p:cTn>
+                  </p:par>
+                  <p:par>
+                    <p:cTn id="37" fill="hold">
+                      <p:stCondLst>
+                        <p:cond delay="indefinite"/>
+                      </p:stCondLst>
+                      <p:childTnLst>
+                        <p:par>
+                          <p:cTn id="38" fill="hold">
+                            <p:stCondLst>
+                              <p:cond delay="0"/>
+                            </p:stCondLst>
+                            <p:childTnLst>
+                              <p:par>
+                                <p:cTn id="39" presetID="2" presetClass="exit" presetSubtype="4" fill="hold" nodeType="clickEffect">
+                                  <p:stCondLst>
+                                    <p:cond delay="0"/>
+                                  </p:stCondLst>
+                                  <p:childTnLst>
+                                    <p:anim calcmode="lin" valueType="num">
+                                      <p:cBhvr additive="base">
+                                        <p:cTn id="40" dur="500"/>
+                                        <p:tgtEl>
+                                          <p:spTgt spid="11"/>
+                                        </p:tgtEl>
+                                        <p:attrNameLst>
+                                          <p:attrName>ppt_x</p:attrName>
+                                        </p:attrNameLst>
+                                      </p:cBhvr>
+                                      <p:tavLst>
+                                        <p:tav tm="0">
+                                          <p:val>
+                                            <p:strVal val="ppt_x"/>
+                                          </p:val>
+                                        </p:tav>
+                                        <p:tav tm="100000">
+                                          <p:val>
+                                            <p:strVal val="ppt_x"/>
+                                          </p:val>
+                                        </p:tav>
+                                      </p:tavLst>
+                                    </p:anim>
+                                    <p:anim calcmode="lin" valueType="num">
+                                      <p:cBhvr additive="base">
+                                        <p:cTn id="41" dur="500"/>
+                                        <p:tgtEl>
+                                          <p:spTgt spid="11"/>
+                                        </p:tgtEl>
+                                        <p:attrNameLst>
+                                          <p:attrName>ppt_y</p:attrName>
+                                        </p:attrNameLst>
+                                      </p:cBhvr>
+                                      <p:tavLst>
+                                        <p:tav tm="0">
+                                          <p:val>
+                                            <p:strVal val="ppt_y"/>
+                                          </p:val>
+                                        </p:tav>
+                                        <p:tav tm="100000">
+                                          <p:val>
+                                            <p:strVal val="1+ppt_h/2"/>
+                                          </p:val>
+                                        </p:tav>
+                                      </p:tavLst>
+                                    </p:anim>
+                                    <p:set>
+                                      <p:cBhvr>
+                                        <p:cTn id="42" dur="1" fill="hold">
+                                          <p:stCondLst>
+                                            <p:cond delay="499"/>
+                                          </p:stCondLst>
+                                        </p:cTn>
+                                        <p:tgtEl>
+                                          <p:spTgt spid="11"/>
+                                        </p:tgtEl>
+                                        <p:attrNameLst>
+                                          <p:attrName>style.visibility</p:attrName>
+                                        </p:attrNameLst>
+                                      </p:cBhvr>
+                                      <p:to>
+                                        <p:strVal val="hidden"/>
+                                      </p:to>
+                                    </p:set>
+                                  </p:childTnLst>
+                                </p:cTn>
+                              </p:par>
+                            </p:childTnLst>
+                          </p:cTn>
+                        </p:par>
+                      </p:childTnLst>
+                    </p:cTn>
+                  </p:par>
+                  <p:par>
+                    <p:cTn id="43" fill="hold">
+                      <p:stCondLst>
+                        <p:cond delay="indefinite"/>
+                      </p:stCondLst>
+                      <p:childTnLst>
+                        <p:par>
+                          <p:cTn id="44" fill="hold">
+                            <p:stCondLst>
+                              <p:cond delay="0"/>
+                            </p:stCondLst>
+                            <p:childTnLst>
+                              <p:par>
+                                <p:cTn id="45" presetID="2" presetClass="exit" presetSubtype="1" fill="hold" grpId="1" nodeType="clickEffect">
+                                  <p:stCondLst>
+                                    <p:cond delay="0"/>
+                                  </p:stCondLst>
+                                  <p:childTnLst>
+                                    <p:anim calcmode="lin" valueType="num">
+                                      <p:cBhvr additive="base">
+                                        <p:cTn id="46" dur="500"/>
+                                        <p:tgtEl>
+                                          <p:spTgt spid="13"/>
+                                        </p:tgtEl>
+                                        <p:attrNameLst>
+                                          <p:attrName>ppt_x</p:attrName>
+                                        </p:attrNameLst>
+                                      </p:cBhvr>
+                                      <p:tavLst>
+                                        <p:tav tm="0">
+                                          <p:val>
+                                            <p:strVal val="ppt_x"/>
+                                          </p:val>
+                                        </p:tav>
+                                        <p:tav tm="100000">
+                                          <p:val>
+                                            <p:strVal val="ppt_x"/>
+                                          </p:val>
+                                        </p:tav>
+                                      </p:tavLst>
+                                    </p:anim>
+                                    <p:anim calcmode="lin" valueType="num">
+                                      <p:cBhvr additive="base">
+                                        <p:cTn id="47" dur="500"/>
+                                        <p:tgtEl>
+                                          <p:spTgt spid="13"/>
+                                        </p:tgtEl>
+                                        <p:attrNameLst>
+                                          <p:attrName>ppt_y</p:attrName>
+                                        </p:attrNameLst>
+                                      </p:cBhvr>
+                                      <p:tavLst>
+                                        <p:tav tm="0">
+                                          <p:val>
+                                            <p:strVal val="ppt_y"/>
+                                          </p:val>
+                                        </p:tav>
+                                        <p:tav tm="100000">
+                                          <p:val>
+                                            <p:strVal val="0-ppt_h/2"/>
+                                          </p:val>
+                                        </p:tav>
+                                      </p:tavLst>
+                                    </p:anim>
+                                    <p:set>
+                                      <p:cBhvr>
+                                        <p:cTn id="48" dur="1" fill="hold">
+                                          <p:stCondLst>
+                                            <p:cond delay="499"/>
+                                          </p:stCondLst>
+                                        </p:cTn>
+                                        <p:tgtEl>
+                                          <p:spTgt spid="13"/>
+                                        </p:tgtEl>
+                                        <p:attrNameLst>
+                                          <p:attrName>style.visibility</p:attrName>
+                                        </p:attrNameLst>
+                                      </p:cBhvr>
+                                      <p:to>
+                                        <p:strVal val="hidden"/>
+                                      </p:to>
+                                    </p:set>
+                                  </p:childTnLst>
+                                </p:cTn>
+                              </p:par>
+                            </p:childTnLst>
+                          </p:cTn>
+                        </p:par>
+                      </p:childTnLst>
+                    </p:cTn>
+                  </p:par>
+                  <p:par>
+                    <p:cTn id="49" fill="hold">
+                      <p:stCondLst>
+                        <p:cond delay="indefinite"/>
+                      </p:stCondLst>
+                      <p:childTnLst>
+                        <p:par>
+                          <p:cTn id="50" fill="hold">
+                            <p:stCondLst>
+                              <p:cond delay="0"/>
+                            </p:stCondLst>
+                            <p:childTnLst>
+                              <p:par>
+                                <p:cTn id="51" presetID="42" presetClass="entr" presetSubtype="0" fill="hold" nodeType="clickEffect">
+                                  <p:stCondLst>
+                                    <p:cond delay="0"/>
+                                  </p:stCondLst>
+                                  <p:childTnLst>
+                                    <p:set>
+                                      <p:cBhvr>
+                                        <p:cTn id="52" dur="1" fill="hold">
+                                          <p:stCondLst>
+                                            <p:cond delay="0"/>
+                                          </p:stCondLst>
+                                        </p:cTn>
+                                        <p:tgtEl>
+                                          <p:spTgt spid="15"/>
+                                        </p:tgtEl>
+                                        <p:attrNameLst>
+                                          <p:attrName>style.visibility</p:attrName>
+                                        </p:attrNameLst>
+                                      </p:cBhvr>
+                                      <p:to>
+                                        <p:strVal val="visible"/>
+                                      </p:to>
+                                    </p:set>
+                                    <p:animEffect transition="in" filter="fade">
+                                      <p:cBhvr>
+                                        <p:cTn id="53" dur="1000"/>
+                                        <p:tgtEl>
+                                          <p:spTgt spid="15"/>
+                                        </p:tgtEl>
+                                      </p:cBhvr>
+                                    </p:animEffect>
+                                    <p:anim calcmode="lin" valueType="num">
+                                      <p:cBhvr>
+                                        <p:cTn id="54" dur="1000" fill="hold"/>
+                                        <p:tgtEl>
+                                          <p:spTgt spid="15"/>
+                                        </p:tgtEl>
+                                        <p:attrNameLst>
+                                          <p:attrName>ppt_x</p:attrName>
+                                        </p:attrNameLst>
+                                      </p:cBhvr>
+                                      <p:tavLst>
+                                        <p:tav tm="0">
+                                          <p:val>
+                                            <p:strVal val="#ppt_x"/>
+                                          </p:val>
+                                        </p:tav>
+                                        <p:tav tm="100000">
+                                          <p:val>
+                                            <p:strVal val="#ppt_x"/>
+                                          </p:val>
+                                        </p:tav>
+                                      </p:tavLst>
+                                    </p:anim>
+                                    <p:anim calcmode="lin" valueType="num">
+                                      <p:cBhvr>
+                                        <p:cTn id="55" dur="1000" fill="hold"/>
+                                        <p:tgtEl>
+                                          <p:spTgt spid="15"/>
+                                        </p:tgtEl>
+                                        <p:attrNameLst>
+                                          <p:attrName>ppt_y</p:attrName>
+                                        </p:attrNameLst>
+                                      </p:cBhvr>
+                                      <p:tavLst>
+                                        <p:tav tm="0">
+                                          <p:val>
+                                            <p:strVal val="#ppt_y+.1"/>
+                                          </p:val>
+                                        </p:tav>
+                                        <p:tav tm="100000">
+                                          <p:val>
+                                            <p:strVal val="#ppt_y"/>
+                                          </p:val>
+                                        </p:tav>
+                                      </p:tavLst>
+                                    </p:anim>
+                                  </p:childTnLst>
+                                </p:cTn>
+                              </p:par>
+                            </p:childTnLst>
+                          </p:cTn>
+                        </p:par>
+                      </p:childTnLst>
+                    </p:cTn>
+                  </p:par>
+                  <p:par>
+                    <p:cTn id="56" fill="hold">
+                      <p:stCondLst>
+                        <p:cond delay="indefinite"/>
+                      </p:stCondLst>
+                      <p:childTnLst>
+                        <p:par>
+                          <p:cTn id="57" fill="hold">
+                            <p:stCondLst>
+                              <p:cond delay="0"/>
+                            </p:stCondLst>
+                            <p:childTnLst>
+                              <p:par>
+                                <p:cTn id="58" presetID="42" presetClass="entr" presetSubtype="0" fill="hold" nodeType="clickEffect">
+                                  <p:stCondLst>
+                                    <p:cond delay="0"/>
+                                  </p:stCondLst>
+                                  <p:childTnLst>
+                                    <p:set>
+                                      <p:cBhvr>
+                                        <p:cTn id="59" dur="1" fill="hold">
+                                          <p:stCondLst>
+                                            <p:cond delay="0"/>
+                                          </p:stCondLst>
+                                        </p:cTn>
+                                        <p:tgtEl>
+                                          <p:spTgt spid="17"/>
+                                        </p:tgtEl>
+                                        <p:attrNameLst>
+                                          <p:attrName>style.visibility</p:attrName>
+                                        </p:attrNameLst>
+                                      </p:cBhvr>
+                                      <p:to>
+                                        <p:strVal val="visible"/>
+                                      </p:to>
+                                    </p:set>
+                                    <p:animEffect transition="in" filter="fade">
+                                      <p:cBhvr>
+                                        <p:cTn id="60" dur="1000"/>
+                                        <p:tgtEl>
+                                          <p:spTgt spid="17"/>
+                                        </p:tgtEl>
+                                      </p:cBhvr>
+                                    </p:animEffect>
+                                    <p:anim calcmode="lin" valueType="num">
+                                      <p:cBhvr>
+                                        <p:cTn id="61" dur="1000" fill="hold"/>
+                                        <p:tgtEl>
+                                          <p:spTgt spid="17"/>
+                                        </p:tgtEl>
+                                        <p:attrNameLst>
+                                          <p:attrName>ppt_x</p:attrName>
+                                        </p:attrNameLst>
+                                      </p:cBhvr>
+                                      <p:tavLst>
+                                        <p:tav tm="0">
+                                          <p:val>
+                                            <p:strVal val="#ppt_x"/>
+                                          </p:val>
+                                        </p:tav>
+                                        <p:tav tm="100000">
+                                          <p:val>
+                                            <p:strVal val="#ppt_x"/>
+                                          </p:val>
+                                        </p:tav>
+                                      </p:tavLst>
+                                    </p:anim>
+                                    <p:anim calcmode="lin" valueType="num">
+                                      <p:cBhvr>
+                                        <p:cTn id="62" dur="1000" fill="hold"/>
+                                        <p:tgtEl>
+                                          <p:spTgt spid="17"/>
+                                        </p:tgtEl>
+                                        <p:attrNameLst>
+                                          <p:attrName>ppt_y</p:attrName>
+                                        </p:attrNameLst>
+                                      </p:cBhvr>
+                                      <p:tavLst>
+                                        <p:tav tm="0">
+                                          <p:val>
+                                            <p:strVal val="#ppt_y+.1"/>
+                                          </p:val>
+                                        </p:tav>
+                                        <p:tav tm="100000">
+                                          <p:val>
+                                            <p:strVal val="#ppt_y"/>
+                                          </p:val>
+                                        </p:tav>
+                                      </p:tavLst>
+                                    </p:anim>
+                                  </p:childTnLst>
+                                </p:cTn>
+                              </p:par>
+                            </p:childTnLst>
+                          </p:cTn>
+                        </p:par>
+                      </p:childTnLst>
+                    </p:cTn>
+                  </p:par>
+                </p:childTnLst>
+              </p:cTn>
+              <p:prevCondLst>
+                <p:cond evt="onPrev" delay="0">
+                  <p:tgtEl>
+                    <p:sldTgt/>
+                  </p:tgtEl>
+                </p:cond>
+              </p:prevCondLst>
+              <p:nextCondLst>
+                <p:cond evt="onNext" delay="0">
+                  <p:tgtEl>
+                    <p:sldTgt/>
+                  </p:tgtEl>
+                </p:cond>
+              </p:nextCondLst>
+            </p:seq>
+          </p:childTnLst>
+        </p:cTn>
+      </p:par>
+    </p:tnLst>
+    <p:bldLst>
+      <p:bldP spid="13" grpId="0"/>
+      <p:bldP spid="13" grpId="1"/>
+    </p:bldLst>
+  </p:timing>
 </p:sld>
 </file>
 

</xml_diff>